<commit_message>
[add] ptn la correction de merde
</commit_message>
<xml_diff>
--- a/Templates/testmercredi.pptx
+++ b/Templates/testmercredi.pptx
@@ -2003,17 +2003,14 @@
               <a:t>Durée d’investissement conseillée : </a:t>
             </a:r>
             <a:r>
+              <a:rPr lang="fr-FR" sz="800" b="1" dirty="0"/>
+              <a:t>&lt;DIC&gt;</a:t>
+            </a:r>
+            <a:r>
               <a:rPr lang="fr-FR" sz="800" b="1" dirty="0">
-                <a:latin typeface="Futura PT" panose="020B0902020204020203" pitchFamily="34" charset="0"/>
-              </a:rPr>
-              <a:t>&lt;DIC&gt;</a:t>
-            </a:r>
-            <a:r>
-              <a:rPr lang="fr-FR" sz="800" b="1" dirty="0">
                 <a:solidFill>
                   <a:srgbClr val="B9A049"/>
                 </a:solidFill>
-                <a:latin typeface="Futura PT" panose="020B0902020204020203" pitchFamily="34" charset="0"/>
               </a:rPr>
               <a:t> </a:t>
             </a:r>
@@ -3473,7 +3470,7 @@
         </p:nvSpPr>
         <p:spPr>
           <a:xfrm>
-            <a:off x="4008562" y="1574957"/>
+            <a:off x="4008562" y="1524157"/>
             <a:ext cx="3189159" cy="2539157"/>
           </a:xfrm>
           <a:prstGeom prst="rect">
@@ -3598,7 +3595,7 @@
                   <a:srgbClr val="00FFFF"/>
                 </a:highlight>
               </a:rPr>
-              <a:t>&lt;TRA.D.P&gt;%</a:t>
+              <a:t>&lt;TRA.D.P&gt;</a:t>
             </a:r>
             <a:r>
               <a:rPr lang="fr-FR" sz="800" baseline="30000" dirty="0"/>
@@ -3617,7 +3614,7 @@
                   <a:srgbClr val="00FFFF"/>
                 </a:highlight>
               </a:rPr>
-              <a:t>&lt;TRA.D.A&gt;%</a:t>
+              <a:t>&lt;TRA.D.A&gt;</a:t>
             </a:r>
             <a:r>
               <a:rPr lang="fr-FR" sz="800" baseline="30000" dirty="0"/>
@@ -3765,7 +3762,7 @@
                 </a:highlight>
                 <a:latin typeface="+mn-lt"/>
               </a:rPr>
-              <a:t>&lt;TRA.RM.P&gt;%</a:t>
+              <a:t>&lt;TRA.RM.P&gt;</a:t>
             </a:r>
             <a:r>
               <a:rPr lang="fr-FR" sz="800" baseline="30000" dirty="0">
@@ -3801,7 +3798,7 @@
                 </a:highlight>
                 <a:latin typeface="+mn-lt"/>
               </a:rPr>
-              <a:t>&lt;TRA.M.SJ&gt;%</a:t>
+              <a:t>&lt;TRA.M.SJ&gt;</a:t>
             </a:r>
             <a:r>
               <a:rPr lang="fr-FR" sz="800" baseline="30000" dirty="0">
@@ -4008,7 +4005,7 @@
                   <a:srgbClr val="00FFFF"/>
                 </a:highlight>
               </a:rPr>
-              <a:t>&lt;TRA.F.P&gt;%</a:t>
+              <a:t>&lt;TRA.F.P&gt;</a:t>
             </a:r>
             <a:r>
               <a:rPr lang="fr-FR" sz="800" baseline="30000" dirty="0">
@@ -4043,7 +4040,7 @@
                   <a:srgbClr val="00FFFF"/>
                 </a:highlight>
               </a:rPr>
-              <a:t>&lt;TRA.F.SJ&gt;%</a:t>
+              <a:t>&lt;TRA.F.SJ&gt;</a:t>
             </a:r>
             <a:r>
               <a:rPr lang="fr-FR" sz="800" baseline="30000" dirty="0">
@@ -21773,7 +21770,7 @@
                 <a:ea typeface="+mn-ea"/>
                 <a:cs typeface="+mn-cs"/>
               </a:rPr>
-              <a:t>n’enregistre pas de baisse de plus de &lt;PDIPERF&gt; par rapport à son &lt;NDR&gt;, l’investisseur accepte de limiter ses gains en cas de forte hausse &lt;SJR7&gt; (Taux de Rendement Annuel net maximum de &lt;TRA.F</a:t>
+              <a:t>n’enregistre pas de baisse de plus de &lt;PDIPERF&gt; par rapport à son &lt;NDR&gt;, l’investisseur accepte de limiter ses gains en cas de forte hausse &lt;SJR7&gt; (Taux de Rendement Annuel net maximum de </a:t>
             </a:r>
             <a:r>
               <a:rPr lang="fr-FR" sz="800" dirty="0">
@@ -21782,10 +21779,10 @@
                 </a:solidFill>
                 <a:latin typeface="Proxima Nova Rg"/>
               </a:rPr>
-              <a:t>.</a:t>
-            </a:r>
-            <a:r>
-              <a:rPr kumimoji="0" lang="fr-FR" sz="800" b="0" i="0" u="none" strike="noStrike" kern="1200" cap="none" spc="0" normalizeH="0" baseline="0" noProof="0" dirty="0">
+              <a:t>&lt;TRA.F.A&gt;(</a:t>
+            </a:r>
+            <a:r>
+              <a:rPr kumimoji="0" lang="fr-FR" sz="800" b="0" i="0" u="none" strike="noStrike" kern="1200" cap="none" spc="0" normalizeH="0" baseline="30000" noProof="0" dirty="0">
                 <a:ln>
                   <a:noFill/>
                 </a:ln>
@@ -21799,24 +21796,7 @@
                 <a:ea typeface="+mn-ea"/>
                 <a:cs typeface="+mn-cs"/>
               </a:rPr>
-              <a:t>A&gt;</a:t>
-            </a:r>
-            <a:r>
-              <a:rPr kumimoji="0" lang="fr-FR" sz="800" b="0" i="0" u="none" strike="noStrike" kern="1200" cap="none" spc="0" normalizeH="0" baseline="30000" noProof="0" dirty="0">
-                <a:ln>
-                  <a:noFill/>
-                </a:ln>
-                <a:solidFill>
-                  <a:schemeClr val="tx1"/>
-                </a:solidFill>
-                <a:effectLst/>
-                <a:uLnTx/>
-                <a:uFillTx/>
-                <a:latin typeface="Proxima Nova Rg"/>
-                <a:ea typeface="+mn-ea"/>
-                <a:cs typeface="+mn-cs"/>
-              </a:rPr>
-              <a:t>(2)</a:t>
+              <a:t>2)</a:t>
             </a:r>
             <a:r>
               <a:rPr kumimoji="0" lang="fr-FR" sz="800" b="0" i="0" u="none" strike="noStrike" kern="1200" cap="none" spc="0" normalizeH="0" baseline="0" noProof="0" dirty="0">
@@ -25893,8 +25873,8 @@
         </p:nvSpPr>
         <p:spPr>
           <a:xfrm>
-            <a:off x="1277442" y="1298007"/>
-            <a:ext cx="5021862" cy="182880"/>
+            <a:off x="1277442" y="1181326"/>
+            <a:ext cx="5021862" cy="492443"/>
           </a:xfrm>
           <a:prstGeom prst="rect">
             <a:avLst/>
@@ -25907,7 +25887,7 @@
           </a:ln>
         </p:spPr>
         <p:txBody>
-          <a:bodyPr wrap="square" lIns="108000" tIns="72000" rIns="108000" bIns="72000" anchor="ctr">
+          <a:bodyPr wrap="square" lIns="108000" tIns="182880" rIns="108000" bIns="182880" anchor="ctr">
             <a:spAutoFit/>
           </a:bodyPr>
           <a:lstStyle>
@@ -27317,8 +27297,8 @@
         </p:nvSpPr>
         <p:spPr>
           <a:xfrm>
-            <a:off x="1028700" y="1821417"/>
-            <a:ext cx="5270604" cy="268517"/>
+            <a:off x="1028700" y="1709454"/>
+            <a:ext cx="5270604" cy="492443"/>
           </a:xfrm>
           <a:prstGeom prst="rect">
             <a:avLst/>
@@ -27331,7 +27311,7 @@
           </a:ln>
         </p:spPr>
         <p:txBody>
-          <a:bodyPr wrap="square" lIns="108000" tIns="72000" rIns="108000" bIns="72000" anchor="ctr">
+          <a:bodyPr wrap="square" lIns="108000" tIns="182880" rIns="108000" bIns="182880" anchor="ctr">
             <a:spAutoFit/>
           </a:bodyPr>
           <a:lstStyle>
@@ -28085,8 +28065,8 @@
         </p:nvSpPr>
         <p:spPr>
           <a:xfrm>
-            <a:off x="1486485" y="5474452"/>
-            <a:ext cx="5025383" cy="394705"/>
+            <a:off x="1028701" y="5441554"/>
+            <a:ext cx="5483168" cy="460502"/>
           </a:xfrm>
           <a:prstGeom prst="rect">
             <a:avLst/>
@@ -28101,7 +28081,7 @@
           </a:ln>
         </p:spPr>
         <p:txBody>
-          <a:bodyPr lIns="108000" tIns="72000" rIns="108000" bIns="72000" anchor="ctr">
+          <a:bodyPr wrap="square" lIns="108000" tIns="137160" rIns="108000" bIns="72000" anchor="ctr">
             <a:spAutoFit/>
           </a:bodyPr>
           <a:lstStyle>
@@ -29376,7 +29356,7 @@
                   <a:srgbClr val="00FFFF"/>
                 </a:highlight>
               </a:rPr>
-              <a:t>&lt;TRA.EM.P&gt; &lt;TRA.MRE.MIN.PM&gt;</a:t>
+              <a:t>&lt;TRA.MRE.MIN.PM&gt;</a:t>
             </a:r>
             <a:r>
               <a:rPr lang="fr-FR" sz="800" baseline="30000" dirty="0"/>
@@ -30048,29 +30028,7 @@
             </a:pPr>
             <a:r>
               <a:rPr lang="fr-FR" sz="800" dirty="0"/>
-              <a:t>(Soit un Taux de Rendement Annuel net inférieur ou égal à </a:t>
-            </a:r>
-            <a:r>
-              <a:rPr lang="fr-FR" sz="800" dirty="0">
-                <a:highlight>
-                  <a:srgbClr val="00FFFF"/>
-                </a:highlight>
-              </a:rPr>
-              <a:t>&lt;TRA.MRD.P&gt;</a:t>
-            </a:r>
-            <a:r>
-              <a:rPr lang="fr-FR" sz="800" baseline="30000" dirty="0">
-                <a:latin typeface="+mn-lt"/>
-              </a:rPr>
-              <a:t>(</a:t>
-            </a:r>
-            <a:r>
-              <a:rPr lang="fr-FR" sz="800" baseline="30000" dirty="0"/>
-              <a:t>2)</a:t>
-            </a:r>
-            <a:r>
-              <a:rPr lang="fr-FR" sz="800" dirty="0"/>
-              <a:t>) &lt;TRA.MED.P&gt;% &lt;TRA.MRD.P&gt;</a:t>
+              <a:t>(Soit un Taux de Rendement Annuel net inférieur ou égal à &lt;TRA.MED.P&gt;</a:t>
             </a:r>
           </a:p>
           <a:p>
@@ -30364,8 +30322,8 @@
         </p:nvSpPr>
         <p:spPr>
           <a:xfrm>
-            <a:off x="1163900" y="2781191"/>
-            <a:ext cx="5030802" cy="760959"/>
+            <a:off x="1163900" y="2842746"/>
+            <a:ext cx="5030802" cy="637849"/>
           </a:xfrm>
           <a:prstGeom prst="rect">
             <a:avLst/>
@@ -30610,7 +30568,7 @@
                   <a:srgbClr val="00FFFF"/>
                 </a:highlight>
               </a:rPr>
-              <a:t>&lt;TRA.MRA.MIN.PM&gt;%</a:t>
+              <a:t>&lt;TRA.MRA.MIN.PM&gt;</a:t>
             </a:r>
             <a:r>
               <a:rPr lang="fr-FR" sz="800" baseline="30000" dirty="0"/>
@@ -30634,7 +30592,7 @@
             </a:r>
             <a:r>
               <a:rPr lang="fr-FR" sz="800" dirty="0"/>
-              <a:t>)     &lt;TRA.TOUT-1.P&gt;  &lt;TRA.TOUT-1.P&gt;%</a:t>
+              <a:t>)</a:t>
             </a:r>
           </a:p>
         </p:txBody>
@@ -33633,7 +33591,7 @@
                   <a:srgbClr val="000000"/>
                 </a:solidFill>
               </a:rPr>
-              <a:t>(soit un Taux de Rendement Annuel net maximum de de </a:t>
+              <a:t>(soit un Taux de Rendement Annuel net maximum de de de </a:t>
             </a:r>
             <a:r>
               <a:rPr lang="fr-FR" sz="800" dirty="0">
@@ -33644,21 +33602,10 @@
                   <a:srgbClr val="00FFFF"/>
                 </a:highlight>
               </a:rPr>
-              <a:t>&lt;TRA.TOUT.</a:t>
-            </a:r>
-            <a:r>
-              <a:rPr lang="fr-FR" sz="800">
-                <a:solidFill>
-                  <a:srgbClr val="000000"/>
-                </a:solidFill>
-                <a:highlight>
-                  <a:srgbClr val="00FFFF"/>
-                </a:highlight>
-              </a:rPr>
-              <a:t>P&gt;</a:t>
-            </a:r>
-            <a:r>
-              <a:rPr lang="fr-FR" sz="800" baseline="30000">
+              <a:t>&lt;TRA.TOUT.P&gt;</a:t>
+            </a:r>
+            <a:r>
+              <a:rPr lang="fr-FR" sz="800" baseline="30000" dirty="0">
                 <a:solidFill>
                   <a:srgbClr val="000000"/>
                 </a:solidFill>
@@ -36418,15 +36365,6 @@
 </file>
 
 <file path=customXml/item1.xml><?xml version="1.0" encoding="utf-8"?>
-<?mso-contentType ?>
-<FormTemplates xmlns="http://schemas.microsoft.com/sharepoint/v3/contenttype/forms">
-  <Display>DocumentLibraryForm</Display>
-  <Edit>DocumentLibraryForm</Edit>
-  <New>DocumentLibraryForm</New>
-</FormTemplates>
-</file>
-
-<file path=customXml/item2.xml><?xml version="1.0" encoding="utf-8"?>
 <ct:contentTypeSchema xmlns:ct="http://schemas.microsoft.com/office/2006/metadata/contentType" xmlns:ma="http://schemas.microsoft.com/office/2006/metadata/properties/metaAttributes" ct:_="" ma:_="" ma:contentTypeName="Document" ma:contentTypeID="0x0101005DDE610BC516E448BB8152259F39635A" ma:contentTypeVersion="13" ma:contentTypeDescription="Crée un document." ma:contentTypeScope="" ma:versionID="4e51a0dab1f5d4663d954168d546c586">
   <xsd:schema xmlns:xsd="http://www.w3.org/2001/XMLSchema" xmlns:xs="http://www.w3.org/2001/XMLSchema" xmlns:p="http://schemas.microsoft.com/office/2006/metadata/properties" xmlns:ns2="ef624bc2-1644-4d69-8362-5c28ca496374" xmlns:ns3="514a554b-82b0-4359-b247-fc84018a95f0" targetNamespace="http://schemas.microsoft.com/office/2006/metadata/properties" ma:root="true" ma:fieldsID="d7b51e5f287975310341ecd8502634d3" ns2:_="" ns3:_="">
     <xsd:import namespace="ef624bc2-1644-4d69-8362-5c28ca496374"/>
@@ -36649,6 +36587,15 @@
 </ct:contentTypeSchema>
 </file>
 
+<file path=customXml/item2.xml><?xml version="1.0" encoding="utf-8"?>
+<?mso-contentType ?>
+<FormTemplates xmlns="http://schemas.microsoft.com/sharepoint/v3/contenttype/forms">
+  <Display>DocumentLibraryForm</Display>
+  <Edit>DocumentLibraryForm</Edit>
+  <New>DocumentLibraryForm</New>
+</FormTemplates>
+</file>
+
 <file path=customXml/item3.xml><?xml version="1.0" encoding="utf-8"?>
 <p:properties xmlns:p="http://schemas.microsoft.com/office/2006/metadata/properties" xmlns:xsi="http://www.w3.org/2001/XMLSchema-instance" xmlns:pc="http://schemas.microsoft.com/office/infopath/2007/PartnerControls">
   <documentManagement>
@@ -36658,14 +36605,6 @@
 </file>
 
 <file path=customXml/itemProps1.xml><?xml version="1.0" encoding="utf-8"?>
-<ds:datastoreItem xmlns:ds="http://schemas.openxmlformats.org/officeDocument/2006/customXml" ds:itemID="{B00FC41E-FBDE-42E2-B58A-20EBD240A376}">
-  <ds:schemaRefs>
-    <ds:schemaRef ds:uri="http://schemas.microsoft.com/sharepoint/v3/contenttype/forms"/>
-  </ds:schemaRefs>
-</ds:datastoreItem>
-</file>
-
-<file path=customXml/itemProps2.xml><?xml version="1.0" encoding="utf-8"?>
 <ds:datastoreItem xmlns:ds="http://schemas.openxmlformats.org/officeDocument/2006/customXml" ds:itemID="{41EF0323-6FE8-41A6-BEA1-CC5178579BBD}">
   <ds:schemaRefs>
     <ds:schemaRef ds:uri="http://schemas.microsoft.com/office/2006/metadata/contentType"/>
@@ -36680,6 +36619,14 @@
     <ds:schemaRef ds:uri="http://purl.org/dc/elements/1.1/"/>
     <ds:schemaRef ds:uri="http://purl.org/dc/terms/"/>
     <ds:schemaRef ds:uri="http://schemas.microsoft.com/internal/obd"/>
+  </ds:schemaRefs>
+</ds:datastoreItem>
+</file>
+
+<file path=customXml/itemProps2.xml><?xml version="1.0" encoding="utf-8"?>
+<ds:datastoreItem xmlns:ds="http://schemas.openxmlformats.org/officeDocument/2006/customXml" ds:itemID="{B00FC41E-FBDE-42E2-B58A-20EBD240A376}">
+  <ds:schemaRefs>
+    <ds:schemaRef ds:uri="http://schemas.microsoft.com/sharepoint/v3/contenttype/forms"/>
   </ds:schemaRefs>
 </ds:datastoreItem>
 </file>

</xml_diff>

<commit_message>
[add] work of the day
</commit_message>
<xml_diff>
--- a/Templates/testmercredi.pptx
+++ b/Templates/testmercredi.pptx
@@ -238,7 +238,7 @@
           <a:p>
             <a:fld id="{515CCE07-1711-4DC7-A7D8-7ED312C82FB8}" type="datetimeFigureOut">
               <a:rPr lang="fr-FR" smtClean="0"/>
-              <a:t>20/05/2022</a:t>
+              <a:t>23/05/2022</a:t>
             </a:fld>
             <a:endParaRPr lang="fr-FR"/>
           </a:p>
@@ -403,7 +403,7 @@
           <a:p>
             <a:fld id="{014ABEAC-8B63-4BD1-9569-A14EB8752A94}" type="datetimeFigureOut">
               <a:rPr lang="fr-FR" smtClean="0"/>
-              <a:t>20/05/2022</a:t>
+              <a:t>23/05/2022</a:t>
             </a:fld>
             <a:endParaRPr lang="fr-FR"/>
           </a:p>
@@ -6166,7 +6166,7 @@
           <p:nvPr>
             <p:extLst>
               <p:ext uri="{D42A27DB-BD31-4B8C-83A1-F6EECF244321}">
-                <p14:modId xmlns:p14="http://schemas.microsoft.com/office/powerpoint/2010/main" val="2018787666"/>
+                <p14:modId xmlns:p14="http://schemas.microsoft.com/office/powerpoint/2010/main" val="4115707583"/>
               </p:ext>
             </p:extLst>
           </p:nvPr>
@@ -9752,7 +9752,7 @@
                         <a:defRPr/>
                       </a:pPr>
                       <a:r>
-                        <a:rPr lang="fr-FR" sz="700" b="0" i="0" kern="1200" dirty="0">
+                        <a:rPr lang="fr-FR" sz="700" b="0" i="0" kern="1200">
                           <a:solidFill>
                             <a:schemeClr val="tx1"/>
                           </a:solidFill>
@@ -9765,6 +9765,17 @@
                         </a:rPr>
                         <a:t>&lt;Datesconstatations1&gt;</a:t>
                       </a:r>
+                      <a:endParaRPr lang="fr-FR" sz="700" b="0" i="0" kern="1200" dirty="0">
+                        <a:solidFill>
+                          <a:schemeClr val="tx1"/>
+                        </a:solidFill>
+                        <a:highlight>
+                          <a:srgbClr val="00FFFF"/>
+                        </a:highlight>
+                        <a:latin typeface="+mn-lt"/>
+                        <a:ea typeface="+mn-ea"/>
+                        <a:cs typeface="+mn-cs"/>
+                      </a:endParaRPr>
                     </a:p>
                   </a:txBody>
                   <a:tcPr marL="72000" marR="72000" marT="46800" marB="46800" anchor="ctr" horzOverflow="overflow">
@@ -13259,7 +13270,7 @@
           <p:nvPr>
             <p:extLst>
               <p:ext uri="{D42A27DB-BD31-4B8C-83A1-F6EECF244321}">
-                <p14:modId xmlns:p14="http://schemas.microsoft.com/office/powerpoint/2010/main" val="1137634670"/>
+                <p14:modId xmlns:p14="http://schemas.microsoft.com/office/powerpoint/2010/main" val="1455076025"/>
               </p:ext>
             </p:extLst>
           </p:nvPr>
@@ -16845,7 +16856,7 @@
                         <a:defRPr/>
                       </a:pPr>
                       <a:r>
-                        <a:rPr lang="fr-FR" sz="700" b="0" i="0" kern="1200">
+                        <a:rPr lang="fr-FR" sz="700" b="0" i="0" kern="1200" dirty="0">
                           <a:solidFill>
                             <a:schemeClr val="tx1"/>
                           </a:solidFill>
@@ -16856,19 +16867,8 @@
                           <a:ea typeface="+mn-ea"/>
                           <a:cs typeface="+mn-cs"/>
                         </a:rPr>
-                        <a:t>&lt;Datesconstatations1&gt;</a:t>
+                        <a:t>&lt;Datesconstatations3&gt;</a:t>
                       </a:r>
-                      <a:endParaRPr lang="fr-FR" sz="700" b="0" i="0" kern="1200" dirty="0">
-                        <a:solidFill>
-                          <a:schemeClr val="tx1"/>
-                        </a:solidFill>
-                        <a:highlight>
-                          <a:srgbClr val="00FFFF"/>
-                        </a:highlight>
-                        <a:latin typeface="+mn-lt"/>
-                        <a:ea typeface="+mn-ea"/>
-                        <a:cs typeface="+mn-cs"/>
-                      </a:endParaRPr>
                     </a:p>
                   </a:txBody>
                   <a:tcPr marL="72000" marR="72000" marT="46800" marB="46800" anchor="ctr" horzOverflow="overflow">
@@ -20729,7 +20729,7 @@
         <p:spPr>
           <a:xfrm>
             <a:off x="458462" y="974579"/>
-            <a:ext cx="6741374" cy="3830279"/>
+            <a:ext cx="6741374" cy="3761030"/>
           </a:xfrm>
           <a:prstGeom prst="rect">
             <a:avLst/>
@@ -21554,7 +21554,7 @@
                 <a:ea typeface="+mn-ea"/>
                 <a:cs typeface="+mn-cs"/>
               </a:rPr>
-              <a:t>ou égal à &lt;ABAC&gt; &lt;balisedeg1&gt;</a:t>
+              <a:t>ou égal à &lt;BCPN&gt; &lt;balisedeg1&gt;</a:t>
             </a:r>
             <a:r>
               <a:rPr kumimoji="0" lang="fr-FR" sz="800" b="0" i="0" u="none" strike="noStrike" kern="1200" cap="none" spc="0" normalizeH="0" baseline="0" noProof="0" dirty="0">
@@ -33656,7 +33656,7 @@
               <a:buChar char="•"/>
             </a:pPr>
             <a:r>
-              <a:rPr lang="fr-FR" sz="800" b="1" dirty="0">
+              <a:rPr lang="fr-FR" sz="800" dirty="0">
                 <a:solidFill>
                   <a:srgbClr val="000000"/>
                 </a:solidFill>
@@ -33664,7 +33664,7 @@
               <a:t>Le rendement de « &lt;NOM&gt; » est très sensible à une faible variation du &lt;SJR3&gt; de clôture &lt;SJR7&gt; autour du seuil de </a:t>
             </a:r>
             <a:r>
-              <a:rPr lang="fr-FR" sz="800" b="1" dirty="0">
+              <a:rPr lang="fr-FR" sz="800" dirty="0">
                 <a:solidFill>
                   <a:srgbClr val="000000"/>
                 </a:solidFill>
@@ -33674,18 +33674,25 @@
               <a:t>&lt;ABAC2&gt; &lt;EBAC&gt; &lt;DESONNDR&gt; </a:t>
             </a:r>
             <a:r>
-              <a:rPr lang="fr-FR" sz="800" b="1" dirty="0">
+              <a:rPr lang="fr-FR" sz="800" dirty="0">
                 <a:effectLst/>
                 <a:ea typeface="Calibri" panose="020F0502020204030204" pitchFamily="34" charset="0"/>
               </a:rPr>
               <a:t>en cours de vie, et des seuils de &lt;BFP&gt; et &lt;PDI&gt; de son &lt;NDR&gt; à la date de constatation finale</a:t>
+            </a:r>
+            <a:r>
+              <a:rPr lang="fr-FR" sz="800" baseline="30000" dirty="0">
+                <a:effectLst/>
+                <a:ea typeface="Calibri" panose="020F0502020204030204" pitchFamily="34" charset="0"/>
+              </a:rPr>
+              <a:t>(1</a:t>
             </a:r>
             <a:r>
               <a:rPr lang="fr-FR" sz="800" b="1" baseline="30000" dirty="0">
                 <a:effectLst/>
                 <a:ea typeface="Calibri" panose="020F0502020204030204" pitchFamily="34" charset="0"/>
               </a:rPr>
-              <a:t>(1)</a:t>
+              <a:t>)</a:t>
             </a:r>
             <a:r>
               <a:rPr lang="fr-FR" sz="800" b="1" dirty="0">
@@ -36365,6 +36372,15 @@
 </file>
 
 <file path=customXml/item1.xml><?xml version="1.0" encoding="utf-8"?>
+<?mso-contentType ?>
+<FormTemplates xmlns="http://schemas.microsoft.com/sharepoint/v3/contenttype/forms">
+  <Display>DocumentLibraryForm</Display>
+  <Edit>DocumentLibraryForm</Edit>
+  <New>DocumentLibraryForm</New>
+</FormTemplates>
+</file>
+
+<file path=customXml/item2.xml><?xml version="1.0" encoding="utf-8"?>
 <ct:contentTypeSchema xmlns:ct="http://schemas.microsoft.com/office/2006/metadata/contentType" xmlns:ma="http://schemas.microsoft.com/office/2006/metadata/properties/metaAttributes" ct:_="" ma:_="" ma:contentTypeName="Document" ma:contentTypeID="0x0101005DDE610BC516E448BB8152259F39635A" ma:contentTypeVersion="13" ma:contentTypeDescription="Crée un document." ma:contentTypeScope="" ma:versionID="4e51a0dab1f5d4663d954168d546c586">
   <xsd:schema xmlns:xsd="http://www.w3.org/2001/XMLSchema" xmlns:xs="http://www.w3.org/2001/XMLSchema" xmlns:p="http://schemas.microsoft.com/office/2006/metadata/properties" xmlns:ns2="ef624bc2-1644-4d69-8362-5c28ca496374" xmlns:ns3="514a554b-82b0-4359-b247-fc84018a95f0" targetNamespace="http://schemas.microsoft.com/office/2006/metadata/properties" ma:root="true" ma:fieldsID="d7b51e5f287975310341ecd8502634d3" ns2:_="" ns3:_="">
     <xsd:import namespace="ef624bc2-1644-4d69-8362-5c28ca496374"/>
@@ -36587,15 +36603,6 @@
 </ct:contentTypeSchema>
 </file>
 
-<file path=customXml/item2.xml><?xml version="1.0" encoding="utf-8"?>
-<?mso-contentType ?>
-<FormTemplates xmlns="http://schemas.microsoft.com/sharepoint/v3/contenttype/forms">
-  <Display>DocumentLibraryForm</Display>
-  <Edit>DocumentLibraryForm</Edit>
-  <New>DocumentLibraryForm</New>
-</FormTemplates>
-</file>
-
 <file path=customXml/item3.xml><?xml version="1.0" encoding="utf-8"?>
 <p:properties xmlns:p="http://schemas.microsoft.com/office/2006/metadata/properties" xmlns:xsi="http://www.w3.org/2001/XMLSchema-instance" xmlns:pc="http://schemas.microsoft.com/office/infopath/2007/PartnerControls">
   <documentManagement>
@@ -36605,6 +36612,14 @@
 </file>
 
 <file path=customXml/itemProps1.xml><?xml version="1.0" encoding="utf-8"?>
+<ds:datastoreItem xmlns:ds="http://schemas.openxmlformats.org/officeDocument/2006/customXml" ds:itemID="{B00FC41E-FBDE-42E2-B58A-20EBD240A376}">
+  <ds:schemaRefs>
+    <ds:schemaRef ds:uri="http://schemas.microsoft.com/sharepoint/v3/contenttype/forms"/>
+  </ds:schemaRefs>
+</ds:datastoreItem>
+</file>
+
+<file path=customXml/itemProps2.xml><?xml version="1.0" encoding="utf-8"?>
 <ds:datastoreItem xmlns:ds="http://schemas.openxmlformats.org/officeDocument/2006/customXml" ds:itemID="{41EF0323-6FE8-41A6-BEA1-CC5178579BBD}">
   <ds:schemaRefs>
     <ds:schemaRef ds:uri="http://schemas.microsoft.com/office/2006/metadata/contentType"/>
@@ -36619,14 +36634,6 @@
     <ds:schemaRef ds:uri="http://purl.org/dc/elements/1.1/"/>
     <ds:schemaRef ds:uri="http://purl.org/dc/terms/"/>
     <ds:schemaRef ds:uri="http://schemas.microsoft.com/internal/obd"/>
-  </ds:schemaRefs>
-</ds:datastoreItem>
-</file>
-
-<file path=customXml/itemProps2.xml><?xml version="1.0" encoding="utf-8"?>
-<ds:datastoreItem xmlns:ds="http://schemas.openxmlformats.org/officeDocument/2006/customXml" ds:itemID="{B00FC41E-FBDE-42E2-B58A-20EBD240A376}">
-  <ds:schemaRefs>
-    <ds:schemaRef ds:uri="http://schemas.microsoft.com/sharepoint/v3/contenttype/forms"/>
   </ds:schemaRefs>
 </ds:datastoreItem>
 </file>

</xml_diff>

<commit_message>
[add] on avance popouze
</commit_message>
<xml_diff>
--- a/Templates/testmercredi.pptx
+++ b/Templates/testmercredi.pptx
@@ -238,7 +238,7 @@
           <a:p>
             <a:fld id="{515CCE07-1711-4DC7-A7D8-7ED312C82FB8}" type="datetimeFigureOut">
               <a:rPr lang="fr-FR" smtClean="0"/>
-              <a:t>23/05/2022</a:t>
+              <a:t>25/05/2022</a:t>
             </a:fld>
             <a:endParaRPr lang="fr-FR"/>
           </a:p>
@@ -403,7 +403,7 @@
           <a:p>
             <a:fld id="{014ABEAC-8B63-4BD1-9569-A14EB8752A94}" type="datetimeFigureOut">
               <a:rPr lang="fr-FR" smtClean="0"/>
-              <a:t>23/05/2022</a:t>
+              <a:t>25/05/2022</a:t>
             </a:fld>
             <a:endParaRPr lang="fr-FR"/>
           </a:p>
@@ -6166,7 +6166,7 @@
           <p:nvPr>
             <p:extLst>
               <p:ext uri="{D42A27DB-BD31-4B8C-83A1-F6EECF244321}">
-                <p14:modId xmlns:p14="http://schemas.microsoft.com/office/powerpoint/2010/main" val="4115707583"/>
+                <p14:modId xmlns:p14="http://schemas.microsoft.com/office/powerpoint/2010/main" val="3800238041"/>
               </p:ext>
             </p:extLst>
           </p:nvPr>
@@ -9752,7 +9752,7 @@
                         <a:defRPr/>
                       </a:pPr>
                       <a:r>
-                        <a:rPr lang="fr-FR" sz="700" b="0" i="0" kern="1200">
+                        <a:rPr lang="fr-FR" sz="700" b="0" i="0" kern="1200" dirty="0">
                           <a:solidFill>
                             <a:schemeClr val="tx1"/>
                           </a:solidFill>
@@ -9763,19 +9763,36 @@
                           <a:ea typeface="+mn-ea"/>
                           <a:cs typeface="+mn-cs"/>
                         </a:rPr>
-                        <a:t>&lt;Datesconstatations1&gt;</a:t>
+                        <a:t>&lt;</a:t>
                       </a:r>
-                      <a:endParaRPr lang="fr-FR" sz="700" b="0" i="0" kern="1200" dirty="0">
-                        <a:solidFill>
-                          <a:schemeClr val="tx1"/>
-                        </a:solidFill>
-                        <a:highlight>
-                          <a:srgbClr val="00FFFF"/>
-                        </a:highlight>
-                        <a:latin typeface="+mn-lt"/>
-                        <a:ea typeface="+mn-ea"/>
-                        <a:cs typeface="+mn-cs"/>
-                      </a:endParaRPr>
+                      <a:r>
+                        <a:rPr lang="fr-FR" sz="700" b="0" i="0" kern="1200" dirty="0" err="1">
+                          <a:solidFill>
+                            <a:schemeClr val="tx1"/>
+                          </a:solidFill>
+                          <a:highlight>
+                            <a:srgbClr val="00FFFF"/>
+                          </a:highlight>
+                          <a:latin typeface="+mn-lt"/>
+                          <a:ea typeface="+mn-ea"/>
+                          <a:cs typeface="+mn-cs"/>
+                        </a:rPr>
+                        <a:t>dates_constat_autocall</a:t>
+                      </a:r>
+                      <a:r>
+                        <a:rPr lang="fr-FR" sz="700" b="0" i="0" kern="1200" dirty="0">
+                          <a:solidFill>
+                            <a:schemeClr val="tx1"/>
+                          </a:solidFill>
+                          <a:highlight>
+                            <a:srgbClr val="00FFFF"/>
+                          </a:highlight>
+                          <a:latin typeface="+mn-lt"/>
+                          <a:ea typeface="+mn-ea"/>
+                          <a:cs typeface="+mn-cs"/>
+                        </a:rPr>
+                        <a:t>&gt;</a:t>
+                      </a:r>
                     </a:p>
                   </a:txBody>
                   <a:tcPr marL="72000" marR="72000" marT="46800" marB="46800" anchor="ctr" horzOverflow="overflow">
@@ -9953,6 +9970,20 @@
                       <a:r>
                         <a:rPr lang="fr-FR" sz="700" b="0" i="0" kern="1200" dirty="0">
                           <a:solidFill>
+                            <a:srgbClr val="FF0000"/>
+                          </a:solidFill>
+                          <a:highlight>
+                            <a:srgbClr val="00FFFF"/>
+                          </a:highlight>
+                          <a:latin typeface="+mn-lt"/>
+                          <a:ea typeface="+mn-ea"/>
+                          <a:cs typeface="+mn-cs"/>
+                        </a:rPr>
+                        <a:t>&lt;</a:t>
+                      </a:r>
+                      <a:r>
+                        <a:rPr lang="fr-FR" sz="700" b="0" i="0" kern="1200" baseline="0" dirty="0" err="1">
+                          <a:solidFill>
                             <a:schemeClr val="tx1"/>
                           </a:solidFill>
                           <a:highlight>
@@ -9962,7 +9993,21 @@
                           <a:ea typeface="+mn-ea"/>
                           <a:cs typeface="+mn-cs"/>
                         </a:rPr>
-                        <a:t>&lt;Datesremb1&gt;</a:t>
+                        <a:t>dates_paiement_autocall</a:t>
+                      </a:r>
+                      <a:r>
+                        <a:rPr lang="fr-FR" sz="700" b="0" i="0" kern="1200" baseline="0" dirty="0">
+                          <a:solidFill>
+                            <a:schemeClr val="tx1"/>
+                          </a:solidFill>
+                          <a:highlight>
+                            <a:srgbClr val="00FFFF"/>
+                          </a:highlight>
+                          <a:latin typeface="+mn-lt"/>
+                          <a:ea typeface="+mn-ea"/>
+                          <a:cs typeface="+mn-cs"/>
+                        </a:rPr>
+                        <a:t>&gt;</a:t>
                       </a:r>
                     </a:p>
                   </a:txBody>
@@ -13270,7 +13315,7 @@
           <p:nvPr>
             <p:extLst>
               <p:ext uri="{D42A27DB-BD31-4B8C-83A1-F6EECF244321}">
-                <p14:modId xmlns:p14="http://schemas.microsoft.com/office/powerpoint/2010/main" val="1455076025"/>
+                <p14:modId xmlns:p14="http://schemas.microsoft.com/office/powerpoint/2010/main" val="2012834819"/>
               </p:ext>
             </p:extLst>
           </p:nvPr>
@@ -16867,7 +16912,35 @@
                           <a:ea typeface="+mn-ea"/>
                           <a:cs typeface="+mn-cs"/>
                         </a:rPr>
-                        <a:t>&lt;Datesconstatations3&gt;</a:t>
+                        <a:t>&lt;</a:t>
+                      </a:r>
+                      <a:r>
+                        <a:rPr lang="fr-FR" sz="700" b="0" i="0" kern="1200" dirty="0" err="1">
+                          <a:solidFill>
+                            <a:schemeClr val="tx1"/>
+                          </a:solidFill>
+                          <a:highlight>
+                            <a:srgbClr val="00FFFF"/>
+                          </a:highlight>
+                          <a:latin typeface="+mn-lt"/>
+                          <a:ea typeface="+mn-ea"/>
+                          <a:cs typeface="+mn-cs"/>
+                        </a:rPr>
+                        <a:t>dates_constat_phoenix</a:t>
+                      </a:r>
+                      <a:r>
+                        <a:rPr lang="fr-FR" sz="700" b="0" i="0" kern="1200" dirty="0">
+                          <a:solidFill>
+                            <a:schemeClr val="tx1"/>
+                          </a:solidFill>
+                          <a:highlight>
+                            <a:srgbClr val="00FFFF"/>
+                          </a:highlight>
+                          <a:latin typeface="+mn-lt"/>
+                          <a:ea typeface="+mn-ea"/>
+                          <a:cs typeface="+mn-cs"/>
+                        </a:rPr>
+                        <a:t>&gt;</a:t>
                       </a:r>
                     </a:p>
                   </a:txBody>
@@ -17055,7 +17128,35 @@
                           <a:ea typeface="+mn-ea"/>
                           <a:cs typeface="+mn-cs"/>
                         </a:rPr>
-                        <a:t>&lt;Datespaiement1&gt;</a:t>
+                        <a:t>&lt;</a:t>
+                      </a:r>
+                      <a:r>
+                        <a:rPr lang="fr-FR" sz="700" b="0" i="0" kern="1200" dirty="0" err="1">
+                          <a:solidFill>
+                            <a:schemeClr val="tx1"/>
+                          </a:solidFill>
+                          <a:highlight>
+                            <a:srgbClr val="00FFFF"/>
+                          </a:highlight>
+                          <a:latin typeface="+mn-lt"/>
+                          <a:ea typeface="+mn-ea"/>
+                          <a:cs typeface="+mn-cs"/>
+                        </a:rPr>
+                        <a:t>dates_paiement_phoenix</a:t>
+                      </a:r>
+                      <a:r>
+                        <a:rPr lang="fr-FR" sz="700" b="0" i="0" kern="1200" dirty="0">
+                          <a:solidFill>
+                            <a:schemeClr val="tx1"/>
+                          </a:solidFill>
+                          <a:highlight>
+                            <a:srgbClr val="00FFFF"/>
+                          </a:highlight>
+                          <a:latin typeface="+mn-lt"/>
+                          <a:ea typeface="+mn-ea"/>
+                          <a:cs typeface="+mn-cs"/>
+                        </a:rPr>
+                        <a:t>&gt;</a:t>
                       </a:r>
                     </a:p>
                   </a:txBody>
@@ -17243,8 +17344,47 @@
                           <a:ea typeface="+mn-ea"/>
                           <a:cs typeface="+mn-cs"/>
                         </a:rPr>
-                        <a:t>&lt;Datesremb1&gt;</a:t>
+                        <a:t>&lt;</a:t>
                       </a:r>
+                      <a:r>
+                        <a:rPr lang="fr-FR" sz="700" b="0" i="0" kern="1200" dirty="0" err="1">
+                          <a:solidFill>
+                            <a:schemeClr val="tx1"/>
+                          </a:solidFill>
+                          <a:highlight>
+                            <a:srgbClr val="00FFFF"/>
+                          </a:highlight>
+                          <a:latin typeface="+mn-lt"/>
+                          <a:ea typeface="+mn-ea"/>
+                          <a:cs typeface="+mn-cs"/>
+                        </a:rPr>
+                        <a:t>dates_last_remboursement_rappel</a:t>
+                      </a:r>
+                      <a:r>
+                        <a:rPr lang="fr-FR" sz="700" b="0" i="0" kern="1200">
+                          <a:solidFill>
+                            <a:schemeClr val="tx1"/>
+                          </a:solidFill>
+                          <a:highlight>
+                            <a:srgbClr val="00FFFF"/>
+                          </a:highlight>
+                          <a:latin typeface="+mn-lt"/>
+                          <a:ea typeface="+mn-ea"/>
+                          <a:cs typeface="+mn-cs"/>
+                        </a:rPr>
+                        <a:t>&gt;</a:t>
+                      </a:r>
+                      <a:endParaRPr lang="fr-FR" sz="700" b="0" i="0" kern="1200" dirty="0">
+                        <a:solidFill>
+                          <a:schemeClr val="tx1"/>
+                        </a:solidFill>
+                        <a:highlight>
+                          <a:srgbClr val="00FFFF"/>
+                        </a:highlight>
+                        <a:latin typeface="+mn-lt"/>
+                        <a:ea typeface="+mn-ea"/>
+                        <a:cs typeface="+mn-cs"/>
+                      </a:endParaRPr>
                     </a:p>
                   </a:txBody>
                   <a:tcPr marL="72000" marR="72000" marT="46800" marB="46800" anchor="ctr" horzOverflow="overflow">
@@ -36372,15 +36512,6 @@
 </file>
 
 <file path=customXml/item1.xml><?xml version="1.0" encoding="utf-8"?>
-<?mso-contentType ?>
-<FormTemplates xmlns="http://schemas.microsoft.com/sharepoint/v3/contenttype/forms">
-  <Display>DocumentLibraryForm</Display>
-  <Edit>DocumentLibraryForm</Edit>
-  <New>DocumentLibraryForm</New>
-</FormTemplates>
-</file>
-
-<file path=customXml/item2.xml><?xml version="1.0" encoding="utf-8"?>
 <ct:contentTypeSchema xmlns:ct="http://schemas.microsoft.com/office/2006/metadata/contentType" xmlns:ma="http://schemas.microsoft.com/office/2006/metadata/properties/metaAttributes" ct:_="" ma:_="" ma:contentTypeName="Document" ma:contentTypeID="0x0101005DDE610BC516E448BB8152259F39635A" ma:contentTypeVersion="13" ma:contentTypeDescription="Crée un document." ma:contentTypeScope="" ma:versionID="4e51a0dab1f5d4663d954168d546c586">
   <xsd:schema xmlns:xsd="http://www.w3.org/2001/XMLSchema" xmlns:xs="http://www.w3.org/2001/XMLSchema" xmlns:p="http://schemas.microsoft.com/office/2006/metadata/properties" xmlns:ns2="ef624bc2-1644-4d69-8362-5c28ca496374" xmlns:ns3="514a554b-82b0-4359-b247-fc84018a95f0" targetNamespace="http://schemas.microsoft.com/office/2006/metadata/properties" ma:root="true" ma:fieldsID="d7b51e5f287975310341ecd8502634d3" ns2:_="" ns3:_="">
     <xsd:import namespace="ef624bc2-1644-4d69-8362-5c28ca496374"/>
@@ -36603,6 +36734,15 @@
 </ct:contentTypeSchema>
 </file>
 
+<file path=customXml/item2.xml><?xml version="1.0" encoding="utf-8"?>
+<?mso-contentType ?>
+<FormTemplates xmlns="http://schemas.microsoft.com/sharepoint/v3/contenttype/forms">
+  <Display>DocumentLibraryForm</Display>
+  <Edit>DocumentLibraryForm</Edit>
+  <New>DocumentLibraryForm</New>
+</FormTemplates>
+</file>
+
 <file path=customXml/item3.xml><?xml version="1.0" encoding="utf-8"?>
 <p:properties xmlns:p="http://schemas.microsoft.com/office/2006/metadata/properties" xmlns:xsi="http://www.w3.org/2001/XMLSchema-instance" xmlns:pc="http://schemas.microsoft.com/office/infopath/2007/PartnerControls">
   <documentManagement>
@@ -36612,14 +36752,6 @@
 </file>
 
 <file path=customXml/itemProps1.xml><?xml version="1.0" encoding="utf-8"?>
-<ds:datastoreItem xmlns:ds="http://schemas.openxmlformats.org/officeDocument/2006/customXml" ds:itemID="{B00FC41E-FBDE-42E2-B58A-20EBD240A376}">
-  <ds:schemaRefs>
-    <ds:schemaRef ds:uri="http://schemas.microsoft.com/sharepoint/v3/contenttype/forms"/>
-  </ds:schemaRefs>
-</ds:datastoreItem>
-</file>
-
-<file path=customXml/itemProps2.xml><?xml version="1.0" encoding="utf-8"?>
 <ds:datastoreItem xmlns:ds="http://schemas.openxmlformats.org/officeDocument/2006/customXml" ds:itemID="{41EF0323-6FE8-41A6-BEA1-CC5178579BBD}">
   <ds:schemaRefs>
     <ds:schemaRef ds:uri="http://schemas.microsoft.com/office/2006/metadata/contentType"/>
@@ -36634,6 +36766,14 @@
     <ds:schemaRef ds:uri="http://purl.org/dc/elements/1.1/"/>
     <ds:schemaRef ds:uri="http://purl.org/dc/terms/"/>
     <ds:schemaRef ds:uri="http://schemas.microsoft.com/internal/obd"/>
+  </ds:schemaRefs>
+</ds:datastoreItem>
+</file>
+
+<file path=customXml/itemProps2.xml><?xml version="1.0" encoding="utf-8"?>
+<ds:datastoreItem xmlns:ds="http://schemas.openxmlformats.org/officeDocument/2006/customXml" ds:itemID="{B00FC41E-FBDE-42E2-B58A-20EBD240A376}">
+  <ds:schemaRefs>
+    <ds:schemaRef ds:uri="http://schemas.microsoft.com/sharepoint/v3/contenttype/forms"/>
   </ds:schemaRefs>
 </ds:datastoreItem>
 </file>

</xml_diff>